<commit_message>
Updating Snippets based on Feedback
</commit_message>
<xml_diff>
--- a/Getting Started with Angular.pptx
+++ b/Getting Started with Angular.pptx
@@ -7,6 +7,9 @@
   <p:notesMasterIdLst>
     <p:notesMasterId r:id="rId25"/>
   </p:notesMasterIdLst>
+  <p:handoutMasterIdLst>
+    <p:handoutMasterId r:id="rId26"/>
+  </p:handoutMasterIdLst>
   <p:sldIdLst>
     <p:sldId id="265" r:id="rId2"/>
     <p:sldId id="257" r:id="rId3"/>
@@ -33,7 +36,7 @@
     <p:sldId id="280" r:id="rId24"/>
   </p:sldIdLst>
   <p:sldSz cx="12192000" cy="6858000"/>
-  <p:notesSz cx="6858000" cy="9144000"/>
+  <p:notesSz cx="6858000" cy="9296400"/>
   <p:defaultTextStyle>
     <a:defPPr>
       <a:defRPr lang="en-US"/>
@@ -129,7 +132,177 @@
       </a:defRPr>
     </a:lvl9pPr>
   </p:defaultTextStyle>
+  <p:extLst>
+    <p:ext uri="{EFAFB233-063F-42B5-8137-9DF3F51BA10A}">
+      <p15:sldGuideLst xmlns:p15="http://schemas.microsoft.com/office/powerpoint/2012/main"/>
+    </p:ext>
+  </p:extLst>
 </p:presentation>
+</file>
+
+<file path=ppt/handoutMasters/handoutMaster1.xml><?xml version="1.0" encoding="utf-8"?>
+<p:handoutMaster xmlns:a="http://schemas.openxmlformats.org/drawingml/2006/main" xmlns:r="http://schemas.openxmlformats.org/officeDocument/2006/relationships" xmlns:p="http://schemas.openxmlformats.org/presentationml/2006/main">
+  <p:cSld>
+    <p:bg>
+      <p:bgRef idx="1001">
+        <a:schemeClr val="bg1"/>
+      </p:bgRef>
+    </p:bg>
+    <p:spTree>
+      <p:nvGrpSpPr>
+        <p:cNvPr id="1" name=""/>
+        <p:cNvGrpSpPr/>
+        <p:nvPr/>
+      </p:nvGrpSpPr>
+      <p:grpSpPr>
+        <a:xfrm>
+          <a:off x="0" y="0"/>
+          <a:ext cx="0" cy="0"/>
+          <a:chOff x="0" y="0"/>
+          <a:chExt cx="0" cy="0"/>
+        </a:xfrm>
+      </p:grpSpPr>
+      <p:sp>
+        <p:nvSpPr>
+          <p:cNvPr id="2" name="Header Placeholder 1"/>
+          <p:cNvSpPr>
+            <a:spLocks noGrp="1"/>
+          </p:cNvSpPr>
+          <p:nvPr>
+            <p:ph type="hdr" sz="quarter"/>
+          </p:nvPr>
+        </p:nvSpPr>
+        <p:spPr>
+          <a:xfrm>
+            <a:off x="0" y="0"/>
+            <a:ext cx="2971800" cy="466725"/>
+          </a:xfrm>
+          <a:prstGeom prst="rect">
+            <a:avLst/>
+          </a:prstGeom>
+        </p:spPr>
+        <p:txBody>
+          <a:bodyPr vert="horz" lIns="91440" tIns="45720" rIns="91440" bIns="45720" rtlCol="0"/>
+          <a:lstStyle>
+            <a:lvl1pPr algn="l">
+              <a:defRPr sz="1200"/>
+            </a:lvl1pPr>
+          </a:lstStyle>
+          <a:p>
+            <a:endParaRPr lang="en-US"/>
+          </a:p>
+        </p:txBody>
+      </p:sp>
+      <p:sp>
+        <p:nvSpPr>
+          <p:cNvPr id="3" name="Date Placeholder 2"/>
+          <p:cNvSpPr>
+            <a:spLocks noGrp="1"/>
+          </p:cNvSpPr>
+          <p:nvPr>
+            <p:ph type="dt" sz="quarter" idx="1"/>
+          </p:nvPr>
+        </p:nvSpPr>
+        <p:spPr>
+          <a:xfrm>
+            <a:off x="3884613" y="0"/>
+            <a:ext cx="2971800" cy="466725"/>
+          </a:xfrm>
+          <a:prstGeom prst="rect">
+            <a:avLst/>
+          </a:prstGeom>
+        </p:spPr>
+        <p:txBody>
+          <a:bodyPr vert="horz" lIns="91440" tIns="45720" rIns="91440" bIns="45720" rtlCol="0"/>
+          <a:lstStyle>
+            <a:lvl1pPr algn="r">
+              <a:defRPr sz="1200"/>
+            </a:lvl1pPr>
+          </a:lstStyle>
+          <a:p>
+            <a:fld id="{ECBF299E-73C6-4CF2-A8BC-2FCB5D467E7A}" type="datetimeFigureOut">
+              <a:rPr lang="en-US" smtClean="0"/>
+              <a:t>1/28/2016</a:t>
+            </a:fld>
+            <a:endParaRPr lang="en-US"/>
+          </a:p>
+        </p:txBody>
+      </p:sp>
+      <p:sp>
+        <p:nvSpPr>
+          <p:cNvPr id="4" name="Footer Placeholder 3"/>
+          <p:cNvSpPr>
+            <a:spLocks noGrp="1"/>
+          </p:cNvSpPr>
+          <p:nvPr>
+            <p:ph type="ftr" sz="quarter" idx="2"/>
+          </p:nvPr>
+        </p:nvSpPr>
+        <p:spPr>
+          <a:xfrm>
+            <a:off x="0" y="8829675"/>
+            <a:ext cx="2971800" cy="466725"/>
+          </a:xfrm>
+          <a:prstGeom prst="rect">
+            <a:avLst/>
+          </a:prstGeom>
+        </p:spPr>
+        <p:txBody>
+          <a:bodyPr vert="horz" lIns="91440" tIns="45720" rIns="91440" bIns="45720" rtlCol="0" anchor="b"/>
+          <a:lstStyle>
+            <a:lvl1pPr algn="l">
+              <a:defRPr sz="1200"/>
+            </a:lvl1pPr>
+          </a:lstStyle>
+          <a:p>
+            <a:endParaRPr lang="en-US"/>
+          </a:p>
+        </p:txBody>
+      </p:sp>
+      <p:sp>
+        <p:nvSpPr>
+          <p:cNvPr id="5" name="Slide Number Placeholder 4"/>
+          <p:cNvSpPr>
+            <a:spLocks noGrp="1"/>
+          </p:cNvSpPr>
+          <p:nvPr>
+            <p:ph type="sldNum" sz="quarter" idx="3"/>
+          </p:nvPr>
+        </p:nvSpPr>
+        <p:spPr>
+          <a:xfrm>
+            <a:off x="3884613" y="8829675"/>
+            <a:ext cx="2971800" cy="466725"/>
+          </a:xfrm>
+          <a:prstGeom prst="rect">
+            <a:avLst/>
+          </a:prstGeom>
+        </p:spPr>
+        <p:txBody>
+          <a:bodyPr vert="horz" lIns="91440" tIns="45720" rIns="91440" bIns="45720" rtlCol="0" anchor="b"/>
+          <a:lstStyle>
+            <a:lvl1pPr algn="r">
+              <a:defRPr sz="1200"/>
+            </a:lvl1pPr>
+          </a:lstStyle>
+          <a:p>
+            <a:fld id="{4AC8B4DA-44A0-4CB3-A822-14E3BADED957}" type="slidenum">
+              <a:rPr lang="en-US" smtClean="0"/>
+              <a:t>‹#›</a:t>
+            </a:fld>
+            <a:endParaRPr lang="en-US"/>
+          </a:p>
+        </p:txBody>
+      </p:sp>
+    </p:spTree>
+    <p:extLst>
+      <p:ext uri="{BB962C8B-B14F-4D97-AF65-F5344CB8AC3E}">
+        <p14:creationId xmlns:p14="http://schemas.microsoft.com/office/powerpoint/2010/main" val="366652225"/>
+      </p:ext>
+    </p:extLst>
+  </p:cSld>
+  <p:clrMap bg1="lt1" tx1="dk1" bg2="lt2" tx2="dk2" accent1="accent1" accent2="accent2" accent3="accent3" accent4="accent4" accent5="accent5" accent6="accent6" hlink="hlink" folHlink="folHlink"/>
+</p:handoutMaster>
 </file>
 
 <file path=ppt/notesMasters/notesMaster1.xml><?xml version="1.0" encoding="utf-8"?>
@@ -167,7 +340,7 @@
         <p:spPr>
           <a:xfrm>
             <a:off x="0" y="0"/>
-            <a:ext cx="2971800" cy="458788"/>
+            <a:ext cx="2971800" cy="466434"/>
           </a:xfrm>
           <a:prstGeom prst="rect">
             <a:avLst/>
@@ -198,7 +371,7 @@
         <p:spPr>
           <a:xfrm>
             <a:off x="3884613" y="0"/>
-            <a:ext cx="2971800" cy="458788"/>
+            <a:ext cx="2971800" cy="466434"/>
           </a:xfrm>
           <a:prstGeom prst="rect">
             <a:avLst/>
@@ -214,7 +387,7 @@
           <a:p>
             <a:fld id="{AED591A0-7CD8-455F-99D6-C6696C9F5340}" type="datetimeFigureOut">
               <a:rPr lang="en-US" smtClean="0"/>
-              <a:t>1/27/2016</a:t>
+              <a:t>1/28/2016</a:t>
             </a:fld>
             <a:endParaRPr lang="en-US"/>
           </a:p>
@@ -232,8 +405,8 @@
         </p:nvSpPr>
         <p:spPr>
           <a:xfrm>
-            <a:off x="685800" y="1143000"/>
-            <a:ext cx="5486400" cy="3086100"/>
+            <a:off x="641350" y="1162050"/>
+            <a:ext cx="5575300" cy="3136900"/>
           </a:xfrm>
           <a:prstGeom prst="rect">
             <a:avLst/>
@@ -265,8 +438,8 @@
         </p:nvSpPr>
         <p:spPr>
           <a:xfrm>
-            <a:off x="685800" y="4400550"/>
-            <a:ext cx="5486400" cy="3600450"/>
+            <a:off x="685800" y="4473892"/>
+            <a:ext cx="5486400" cy="3660458"/>
           </a:xfrm>
           <a:prstGeom prst="rect">
             <a:avLst/>
@@ -325,8 +498,8 @@
         </p:nvSpPr>
         <p:spPr>
           <a:xfrm>
-            <a:off x="0" y="8685213"/>
-            <a:ext cx="2971800" cy="458787"/>
+            <a:off x="0" y="8829967"/>
+            <a:ext cx="2971800" cy="466433"/>
           </a:xfrm>
           <a:prstGeom prst="rect">
             <a:avLst/>
@@ -356,8 +529,8 @@
         </p:nvSpPr>
         <p:spPr>
           <a:xfrm>
-            <a:off x="3884613" y="8685213"/>
-            <a:ext cx="2971800" cy="458787"/>
+            <a:off x="3884613" y="8829967"/>
+            <a:ext cx="2971800" cy="466433"/>
           </a:xfrm>
           <a:prstGeom prst="rect">
             <a:avLst/>
@@ -5332,7 +5505,7 @@
           <a:p>
             <a:fld id="{73E8CBF3-1852-4B4C-8900-DE379E63FBA8}" type="datetimeFigureOut">
               <a:rPr lang="en-US" smtClean="0"/>
-              <a:t>1/26/2016</a:t>
+              <a:t>1/28/2016</a:t>
             </a:fld>
             <a:endParaRPr lang="en-US"/>
           </a:p>
@@ -5502,7 +5675,7 @@
           <a:p>
             <a:fld id="{73E8CBF3-1852-4B4C-8900-DE379E63FBA8}" type="datetimeFigureOut">
               <a:rPr lang="en-US" smtClean="0"/>
-              <a:t>1/26/2016</a:t>
+              <a:t>1/28/2016</a:t>
             </a:fld>
             <a:endParaRPr lang="en-US"/>
           </a:p>
@@ -5682,7 +5855,7 @@
           <a:p>
             <a:fld id="{73E8CBF3-1852-4B4C-8900-DE379E63FBA8}" type="datetimeFigureOut">
               <a:rPr lang="en-US" smtClean="0"/>
-              <a:t>1/26/2016</a:t>
+              <a:t>1/28/2016</a:t>
             </a:fld>
             <a:endParaRPr lang="en-US"/>
           </a:p>
@@ -5852,7 +6025,7 @@
           <a:p>
             <a:fld id="{73E8CBF3-1852-4B4C-8900-DE379E63FBA8}" type="datetimeFigureOut">
               <a:rPr lang="en-US" smtClean="0"/>
-              <a:t>1/26/2016</a:t>
+              <a:t>1/28/2016</a:t>
             </a:fld>
             <a:endParaRPr lang="en-US"/>
           </a:p>
@@ -6098,7 +6271,7 @@
           <a:p>
             <a:fld id="{73E8CBF3-1852-4B4C-8900-DE379E63FBA8}" type="datetimeFigureOut">
               <a:rPr lang="en-US" smtClean="0"/>
-              <a:t>1/26/2016</a:t>
+              <a:t>1/28/2016</a:t>
             </a:fld>
             <a:endParaRPr lang="en-US"/>
           </a:p>
@@ -6330,7 +6503,7 @@
           <a:p>
             <a:fld id="{73E8CBF3-1852-4B4C-8900-DE379E63FBA8}" type="datetimeFigureOut">
               <a:rPr lang="en-US" smtClean="0"/>
-              <a:t>1/26/2016</a:t>
+              <a:t>1/28/2016</a:t>
             </a:fld>
             <a:endParaRPr lang="en-US"/>
           </a:p>
@@ -6697,7 +6870,7 @@
           <a:p>
             <a:fld id="{73E8CBF3-1852-4B4C-8900-DE379E63FBA8}" type="datetimeFigureOut">
               <a:rPr lang="en-US" smtClean="0"/>
-              <a:t>1/26/2016</a:t>
+              <a:t>1/28/2016</a:t>
             </a:fld>
             <a:endParaRPr lang="en-US"/>
           </a:p>
@@ -6815,7 +6988,7 @@
           <a:p>
             <a:fld id="{73E8CBF3-1852-4B4C-8900-DE379E63FBA8}" type="datetimeFigureOut">
               <a:rPr lang="en-US" smtClean="0"/>
-              <a:t>1/26/2016</a:t>
+              <a:t>1/28/2016</a:t>
             </a:fld>
             <a:endParaRPr lang="en-US"/>
           </a:p>
@@ -6910,7 +7083,7 @@
           <a:p>
             <a:fld id="{73E8CBF3-1852-4B4C-8900-DE379E63FBA8}" type="datetimeFigureOut">
               <a:rPr lang="en-US" smtClean="0"/>
-              <a:t>1/26/2016</a:t>
+              <a:t>1/28/2016</a:t>
             </a:fld>
             <a:endParaRPr lang="en-US"/>
           </a:p>
@@ -7187,7 +7360,7 @@
           <a:p>
             <a:fld id="{73E8CBF3-1852-4B4C-8900-DE379E63FBA8}" type="datetimeFigureOut">
               <a:rPr lang="en-US" smtClean="0"/>
-              <a:t>1/26/2016</a:t>
+              <a:t>1/28/2016</a:t>
             </a:fld>
             <a:endParaRPr lang="en-US"/>
           </a:p>
@@ -7440,7 +7613,7 @@
           <a:p>
             <a:fld id="{73E8CBF3-1852-4B4C-8900-DE379E63FBA8}" type="datetimeFigureOut">
               <a:rPr lang="en-US" smtClean="0"/>
-              <a:t>1/26/2016</a:t>
+              <a:t>1/28/2016</a:t>
             </a:fld>
             <a:endParaRPr lang="en-US"/>
           </a:p>
@@ -7653,7 +7826,7 @@
           <a:p>
             <a:fld id="{73E8CBF3-1852-4B4C-8900-DE379E63FBA8}" type="datetimeFigureOut">
               <a:rPr lang="en-US" smtClean="0"/>
-              <a:t>1/26/2016</a:t>
+              <a:t>1/28/2016</a:t>
             </a:fld>
             <a:endParaRPr lang="en-US"/>
           </a:p>
@@ -8893,6 +9066,40 @@
           </a:p>
         </p:txBody>
       </p:sp>
+      <p:sp>
+        <p:nvSpPr>
+          <p:cNvPr id="9" name="TextBox 8"/>
+          <p:cNvSpPr txBox="1"/>
+          <p:nvPr/>
+        </p:nvSpPr>
+        <p:spPr>
+          <a:xfrm>
+            <a:off x="389494" y="6432273"/>
+            <a:ext cx="1572611" cy="276999"/>
+          </a:xfrm>
+          <a:prstGeom prst="rect">
+            <a:avLst/>
+          </a:prstGeom>
+          <a:noFill/>
+        </p:spPr>
+        <p:txBody>
+          <a:bodyPr wrap="none" rtlCol="0">
+            <a:spAutoFit/>
+          </a:bodyPr>
+          <a:lstStyle/>
+          <a:p>
+            <a:r>
+              <a:rPr lang="en-US" sz="1200" dirty="0" err="1" smtClean="0"/>
+              <a:t>src</a:t>
+            </a:r>
+            <a:r>
+              <a:rPr lang="en-US" sz="1200" dirty="0" smtClean="0"/>
+              <a:t>/app/index.route.js</a:t>
+            </a:r>
+            <a:endParaRPr lang="en-US" sz="1200" dirty="0"/>
+          </a:p>
+        </p:txBody>
+      </p:sp>
     </p:spTree>
     <p:extLst>
       <p:ext uri="{BB962C8B-B14F-4D97-AF65-F5344CB8AC3E}">
@@ -9236,6 +9443,48 @@
           </a:p>
         </p:txBody>
       </p:sp>
+      <p:sp>
+        <p:nvSpPr>
+          <p:cNvPr id="8" name="TextBox 7"/>
+          <p:cNvSpPr txBox="1"/>
+          <p:nvPr/>
+        </p:nvSpPr>
+        <p:spPr>
+          <a:xfrm>
+            <a:off x="5088882" y="6432273"/>
+            <a:ext cx="2577437" cy="276999"/>
+          </a:xfrm>
+          <a:prstGeom prst="rect">
+            <a:avLst/>
+          </a:prstGeom>
+          <a:noFill/>
+        </p:spPr>
+        <p:txBody>
+          <a:bodyPr wrap="none" rtlCol="0">
+            <a:spAutoFit/>
+          </a:bodyPr>
+          <a:lstStyle/>
+          <a:p>
+            <a:r>
+              <a:rPr lang="en-US" sz="1200" dirty="0" err="1" smtClean="0"/>
+              <a:t>src</a:t>
+            </a:r>
+            <a:r>
+              <a:rPr lang="en-US" sz="1200" dirty="0" smtClean="0"/>
+              <a:t>/app/</a:t>
+            </a:r>
+            <a:r>
+              <a:rPr lang="en-US" sz="1200" dirty="0" err="1" smtClean="0"/>
+              <a:t>iforecast</a:t>
+            </a:r>
+            <a:r>
+              <a:rPr lang="en-US" sz="1200" dirty="0" smtClean="0"/>
+              <a:t>/forecast.controller.js</a:t>
+            </a:r>
+            <a:endParaRPr lang="en-US" sz="1200" dirty="0"/>
+          </a:p>
+        </p:txBody>
+      </p:sp>
     </p:spTree>
     <p:extLst>
       <p:ext uri="{BB962C8B-B14F-4D97-AF65-F5344CB8AC3E}">
@@ -9283,7 +9532,12 @@
             <p:ph type="title"/>
           </p:nvPr>
         </p:nvSpPr>
-        <p:spPr/>
+        <p:spPr>
+          <a:xfrm>
+            <a:off x="96327" y="180180"/>
+            <a:ext cx="10515600" cy="1325563"/>
+          </a:xfrm>
+        </p:spPr>
         <p:txBody>
           <a:bodyPr/>
           <a:lstStyle/>
@@ -9308,7 +9562,7 @@
         </p:nvSpPr>
         <p:spPr>
           <a:xfrm>
-            <a:off x="838199" y="1366982"/>
+            <a:off x="96327" y="1142723"/>
             <a:ext cx="10975109" cy="5375563"/>
           </a:xfrm>
         </p:spPr>
@@ -9403,7 +9657,7 @@
         </p:blipFill>
         <p:spPr>
           <a:xfrm>
-            <a:off x="287811" y="1798621"/>
+            <a:off x="96327" y="1571910"/>
             <a:ext cx="4611721" cy="4860363"/>
           </a:xfrm>
           <a:prstGeom prst="rect">
@@ -9427,7 +9681,7 @@
         </p:blipFill>
         <p:spPr>
           <a:xfrm>
-            <a:off x="5156766" y="1798621"/>
+            <a:off x="4858143" y="1571910"/>
             <a:ext cx="4751027" cy="3263749"/>
           </a:xfrm>
           <a:prstGeom prst="rect">
@@ -9485,6 +9739,40 @@
             <a:r>
               <a:rPr lang="en-US" sz="1200" dirty="0" smtClean="0"/>
               <a:t>Snippet_03.html</a:t>
+            </a:r>
+            <a:endParaRPr lang="en-US" sz="1200" dirty="0"/>
+          </a:p>
+        </p:txBody>
+      </p:sp>
+      <p:sp>
+        <p:nvSpPr>
+          <p:cNvPr id="9" name="TextBox 8"/>
+          <p:cNvSpPr txBox="1"/>
+          <p:nvPr/>
+        </p:nvSpPr>
+        <p:spPr>
+          <a:xfrm>
+            <a:off x="96327" y="6498440"/>
+            <a:ext cx="2101344" cy="276999"/>
+          </a:xfrm>
+          <a:prstGeom prst="rect">
+            <a:avLst/>
+          </a:prstGeom>
+          <a:noFill/>
+        </p:spPr>
+        <p:txBody>
+          <a:bodyPr wrap="none" rtlCol="0">
+            <a:spAutoFit/>
+          </a:bodyPr>
+          <a:lstStyle/>
+          <a:p>
+            <a:r>
+              <a:rPr lang="en-US" sz="1200" dirty="0" err="1" smtClean="0"/>
+              <a:t>src</a:t>
+            </a:r>
+            <a:r>
+              <a:rPr lang="en-US" sz="1200" dirty="0" smtClean="0"/>
+              <a:t>/app/forecast/forecast.html</a:t>
             </a:r>
             <a:endParaRPr lang="en-US" sz="1200" dirty="0"/>
           </a:p>
@@ -9537,7 +9825,12 @@
             <p:ph type="title"/>
           </p:nvPr>
         </p:nvSpPr>
-        <p:spPr/>
+        <p:spPr>
+          <a:xfrm>
+            <a:off x="389494" y="61191"/>
+            <a:ext cx="10515600" cy="1325563"/>
+          </a:xfrm>
+        </p:spPr>
         <p:txBody>
           <a:bodyPr/>
           <a:lstStyle/>
@@ -9562,7 +9855,7 @@
         </p:nvSpPr>
         <p:spPr>
           <a:xfrm>
-            <a:off x="838199" y="1366982"/>
+            <a:off x="389494" y="1056710"/>
             <a:ext cx="10975109" cy="5375563"/>
           </a:xfrm>
         </p:spPr>
@@ -9657,7 +9950,7 @@
         </p:blipFill>
         <p:spPr>
           <a:xfrm>
-            <a:off x="471926" y="1802431"/>
+            <a:off x="471926" y="1521079"/>
             <a:ext cx="3357796" cy="4746050"/>
           </a:xfrm>
           <a:prstGeom prst="rect">
@@ -9776,6 +10069,48 @@
             <a:r>
               <a:rPr lang="en-US" sz="1200" dirty="0" smtClean="0"/>
               <a:t>Snippet_04.js</a:t>
+            </a:r>
+            <a:endParaRPr lang="en-US" sz="1200" dirty="0"/>
+          </a:p>
+        </p:txBody>
+      </p:sp>
+      <p:sp>
+        <p:nvSpPr>
+          <p:cNvPr id="8" name="TextBox 7"/>
+          <p:cNvSpPr txBox="1"/>
+          <p:nvPr/>
+        </p:nvSpPr>
+        <p:spPr>
+          <a:xfrm>
+            <a:off x="389494" y="6432273"/>
+            <a:ext cx="3693896" cy="276999"/>
+          </a:xfrm>
+          <a:prstGeom prst="rect">
+            <a:avLst/>
+          </a:prstGeom>
+          <a:noFill/>
+        </p:spPr>
+        <p:txBody>
+          <a:bodyPr wrap="none" rtlCol="0">
+            <a:spAutoFit/>
+          </a:bodyPr>
+          <a:lstStyle/>
+          <a:p>
+            <a:r>
+              <a:rPr lang="en-US" sz="1200" dirty="0" err="1" smtClean="0"/>
+              <a:t>src</a:t>
+            </a:r>
+            <a:r>
+              <a:rPr lang="en-US" sz="1200" dirty="0" smtClean="0"/>
+              <a:t>/app/components/</a:t>
+            </a:r>
+            <a:r>
+              <a:rPr lang="en-US" sz="1200" dirty="0" err="1" smtClean="0"/>
+              <a:t>weatherService</a:t>
+            </a:r>
+            <a:r>
+              <a:rPr lang="en-US" sz="1200" dirty="0" smtClean="0"/>
+              <a:t>/weather.service.js</a:t>
             </a:r>
             <a:endParaRPr lang="en-US" sz="1200" dirty="0"/>
           </a:p>
@@ -9828,7 +10163,12 @@
             <p:ph type="title"/>
           </p:nvPr>
         </p:nvSpPr>
-        <p:spPr/>
+        <p:spPr>
+          <a:xfrm>
+            <a:off x="76200" y="0"/>
+            <a:ext cx="10515600" cy="1325563"/>
+          </a:xfrm>
+        </p:spPr>
         <p:txBody>
           <a:bodyPr/>
           <a:lstStyle/>
@@ -9853,7 +10193,7 @@
         </p:nvSpPr>
         <p:spPr>
           <a:xfrm>
-            <a:off x="838199" y="1366982"/>
+            <a:off x="130753" y="990916"/>
             <a:ext cx="10975109" cy="5375563"/>
           </a:xfrm>
         </p:spPr>
@@ -10052,7 +10392,7 @@
         </p:blipFill>
         <p:spPr>
           <a:xfrm>
-            <a:off x="147036" y="1822276"/>
+            <a:off x="130753" y="1451680"/>
             <a:ext cx="7168164" cy="4788681"/>
           </a:xfrm>
           <a:prstGeom prst="rect">
@@ -10068,7 +10408,7 @@
         </p:nvSpPr>
         <p:spPr>
           <a:xfrm>
-            <a:off x="4721101" y="4152452"/>
+            <a:off x="4715567" y="3745786"/>
             <a:ext cx="1722730" cy="383353"/>
           </a:xfrm>
           <a:prstGeom prst="rect">
@@ -10111,7 +10451,7 @@
         </p:nvSpPr>
         <p:spPr>
           <a:xfrm>
-            <a:off x="1646205" y="5021908"/>
+            <a:off x="1646206" y="4660861"/>
             <a:ext cx="3074895" cy="383353"/>
           </a:xfrm>
           <a:prstGeom prst="rect">
@@ -10172,6 +10512,40 @@
             <a:r>
               <a:rPr lang="en-US" sz="1200" dirty="0" smtClean="0"/>
               <a:t>Snippet_05.js</a:t>
+            </a:r>
+            <a:endParaRPr lang="en-US" sz="1200" dirty="0"/>
+          </a:p>
+        </p:txBody>
+      </p:sp>
+      <p:sp>
+        <p:nvSpPr>
+          <p:cNvPr id="11" name="TextBox 10"/>
+          <p:cNvSpPr txBox="1"/>
+          <p:nvPr/>
+        </p:nvSpPr>
+        <p:spPr>
+          <a:xfrm>
+            <a:off x="389494" y="6432273"/>
+            <a:ext cx="2542171" cy="276999"/>
+          </a:xfrm>
+          <a:prstGeom prst="rect">
+            <a:avLst/>
+          </a:prstGeom>
+          <a:noFill/>
+        </p:spPr>
+        <p:txBody>
+          <a:bodyPr wrap="none" rtlCol="0">
+            <a:spAutoFit/>
+          </a:bodyPr>
+          <a:lstStyle/>
+          <a:p>
+            <a:r>
+              <a:rPr lang="en-US" sz="1200" dirty="0" err="1" smtClean="0"/>
+              <a:t>src</a:t>
+            </a:r>
+            <a:r>
+              <a:rPr lang="en-US" sz="1200" dirty="0" smtClean="0"/>
+              <a:t>/app/forecast/forecast.controller.js</a:t>
             </a:r>
             <a:endParaRPr lang="en-US" sz="1200" dirty="0"/>
           </a:p>
@@ -10859,6 +11233,40 @@
           </a:p>
         </p:txBody>
       </p:sp>
+      <p:sp>
+        <p:nvSpPr>
+          <p:cNvPr id="20" name="TextBox 19"/>
+          <p:cNvSpPr txBox="1"/>
+          <p:nvPr/>
+        </p:nvSpPr>
+        <p:spPr>
+          <a:xfrm>
+            <a:off x="6039172" y="6432272"/>
+            <a:ext cx="2101344" cy="276999"/>
+          </a:xfrm>
+          <a:prstGeom prst="rect">
+            <a:avLst/>
+          </a:prstGeom>
+          <a:noFill/>
+        </p:spPr>
+        <p:txBody>
+          <a:bodyPr wrap="none" rtlCol="0">
+            <a:spAutoFit/>
+          </a:bodyPr>
+          <a:lstStyle/>
+          <a:p>
+            <a:r>
+              <a:rPr lang="en-US" sz="1200" dirty="0" err="1" smtClean="0"/>
+              <a:t>src</a:t>
+            </a:r>
+            <a:r>
+              <a:rPr lang="en-US" sz="1200" dirty="0" smtClean="0"/>
+              <a:t>/app/forecast/forecast.html</a:t>
+            </a:r>
+            <a:endParaRPr lang="en-US" sz="1200" dirty="0"/>
+          </a:p>
+        </p:txBody>
+      </p:sp>
     </p:spTree>
     <p:extLst>
       <p:ext uri="{BB962C8B-B14F-4D97-AF65-F5344CB8AC3E}">
@@ -11255,6 +11663,40 @@
           </a:p>
         </p:txBody>
       </p:sp>
+      <p:sp>
+        <p:nvSpPr>
+          <p:cNvPr id="11" name="TextBox 10"/>
+          <p:cNvSpPr txBox="1"/>
+          <p:nvPr/>
+        </p:nvSpPr>
+        <p:spPr>
+          <a:xfrm>
+            <a:off x="389494" y="6432273"/>
+            <a:ext cx="2101344" cy="276999"/>
+          </a:xfrm>
+          <a:prstGeom prst="rect">
+            <a:avLst/>
+          </a:prstGeom>
+          <a:noFill/>
+        </p:spPr>
+        <p:txBody>
+          <a:bodyPr wrap="none" rtlCol="0">
+            <a:spAutoFit/>
+          </a:bodyPr>
+          <a:lstStyle/>
+          <a:p>
+            <a:r>
+              <a:rPr lang="en-US" sz="1200" dirty="0" err="1" smtClean="0"/>
+              <a:t>src</a:t>
+            </a:r>
+            <a:r>
+              <a:rPr lang="en-US" sz="1200" dirty="0" smtClean="0"/>
+              <a:t>/app/forecast/forecast.html</a:t>
+            </a:r>
+            <a:endParaRPr lang="en-US" sz="1200" dirty="0"/>
+          </a:p>
+        </p:txBody>
+      </p:sp>
     </p:spTree>
     <p:extLst>
       <p:ext uri="{BB962C8B-B14F-4D97-AF65-F5344CB8AC3E}">
@@ -11658,6 +12100,40 @@
           </a:prstGeom>
         </p:spPr>
       </p:pic>
+      <p:sp>
+        <p:nvSpPr>
+          <p:cNvPr id="8" name="TextBox 7"/>
+          <p:cNvSpPr txBox="1"/>
+          <p:nvPr/>
+        </p:nvSpPr>
+        <p:spPr>
+          <a:xfrm>
+            <a:off x="389494" y="6432273"/>
+            <a:ext cx="2542171" cy="276999"/>
+          </a:xfrm>
+          <a:prstGeom prst="rect">
+            <a:avLst/>
+          </a:prstGeom>
+          <a:noFill/>
+        </p:spPr>
+        <p:txBody>
+          <a:bodyPr wrap="none" rtlCol="0">
+            <a:spAutoFit/>
+          </a:bodyPr>
+          <a:lstStyle/>
+          <a:p>
+            <a:r>
+              <a:rPr lang="en-US" sz="1200" dirty="0" err="1" smtClean="0"/>
+              <a:t>src</a:t>
+            </a:r>
+            <a:r>
+              <a:rPr lang="en-US" sz="1200" dirty="0" smtClean="0"/>
+              <a:t>/app/forecast/forecast.controller.js</a:t>
+            </a:r>
+            <a:endParaRPr lang="en-US" sz="1200" dirty="0"/>
+          </a:p>
+        </p:txBody>
+      </p:sp>
     </p:spTree>
     <p:extLst>
       <p:ext uri="{BB962C8B-B14F-4D97-AF65-F5344CB8AC3E}">
@@ -12228,6 +12704,82 @@
           </a:p>
         </p:txBody>
       </p:sp>
+      <p:sp>
+        <p:nvSpPr>
+          <p:cNvPr id="16" name="TextBox 15"/>
+          <p:cNvSpPr txBox="1"/>
+          <p:nvPr/>
+        </p:nvSpPr>
+        <p:spPr>
+          <a:xfrm>
+            <a:off x="260513" y="5697100"/>
+            <a:ext cx="2542171" cy="276999"/>
+          </a:xfrm>
+          <a:prstGeom prst="rect">
+            <a:avLst/>
+          </a:prstGeom>
+          <a:noFill/>
+        </p:spPr>
+        <p:txBody>
+          <a:bodyPr wrap="none" rtlCol="0">
+            <a:spAutoFit/>
+          </a:bodyPr>
+          <a:lstStyle/>
+          <a:p>
+            <a:r>
+              <a:rPr lang="en-US" sz="1200" dirty="0" err="1" smtClean="0"/>
+              <a:t>src</a:t>
+            </a:r>
+            <a:r>
+              <a:rPr lang="en-US" sz="1200" dirty="0" smtClean="0"/>
+              <a:t>/app/forecast/forecast.controller.js</a:t>
+            </a:r>
+            <a:endParaRPr lang="en-US" sz="1200" dirty="0"/>
+          </a:p>
+        </p:txBody>
+      </p:sp>
+      <p:sp>
+        <p:nvSpPr>
+          <p:cNvPr id="17" name="TextBox 16"/>
+          <p:cNvSpPr txBox="1"/>
+          <p:nvPr/>
+        </p:nvSpPr>
+        <p:spPr>
+          <a:xfrm>
+            <a:off x="3961147" y="6441065"/>
+            <a:ext cx="3693896" cy="276999"/>
+          </a:xfrm>
+          <a:prstGeom prst="rect">
+            <a:avLst/>
+          </a:prstGeom>
+          <a:noFill/>
+        </p:spPr>
+        <p:txBody>
+          <a:bodyPr wrap="none" rtlCol="0">
+            <a:spAutoFit/>
+          </a:bodyPr>
+          <a:lstStyle/>
+          <a:p>
+            <a:r>
+              <a:rPr lang="en-US" sz="1200" dirty="0" err="1" smtClean="0"/>
+              <a:t>src</a:t>
+            </a:r>
+            <a:r>
+              <a:rPr lang="en-US" sz="1200" dirty="0" smtClean="0"/>
+              <a:t>/app/components/</a:t>
+            </a:r>
+            <a:r>
+              <a:rPr lang="en-US" sz="1200" dirty="0" err="1" smtClean="0"/>
+              <a:t>weatherService</a:t>
+            </a:r>
+            <a:r>
+              <a:rPr lang="en-US" sz="1200" dirty="0" smtClean="0"/>
+              <a:t>/weather.service.js</a:t>
+            </a:r>
+            <a:endParaRPr lang="en-US" sz="1200" dirty="0"/>
+          </a:p>
+        </p:txBody>
+      </p:sp>
     </p:spTree>
     <p:extLst>
       <p:ext uri="{BB962C8B-B14F-4D97-AF65-F5344CB8AC3E}">
@@ -12396,7 +12948,6 @@
               <a:rPr lang="en-US" sz="2000" dirty="0" smtClean="0"/>
               <a:t>the visual output as HTML</a:t>
             </a:r>
-            <a:endParaRPr lang="en-US" sz="2000" dirty="0" smtClean="0"/>
           </a:p>
           <a:p>
             <a:pPr marL="0" indent="0">
@@ -12789,7 +13340,6 @@
               <a:rPr lang="en-US" sz="1600" dirty="0" smtClean="0"/>
               <a:t>: Only matches class name</a:t>
             </a:r>
-            <a:endParaRPr lang="en-US" sz="1600" dirty="0" smtClean="0"/>
           </a:p>
           <a:p>
             <a:pPr marL="742950" lvl="1" indent="-285750">
@@ -12915,6 +13465,48 @@
           </a:prstGeom>
         </p:spPr>
       </p:pic>
+      <p:sp>
+        <p:nvSpPr>
+          <p:cNvPr id="8" name="TextBox 7"/>
+          <p:cNvSpPr txBox="1"/>
+          <p:nvPr/>
+        </p:nvSpPr>
+        <p:spPr>
+          <a:xfrm>
+            <a:off x="196794" y="6551432"/>
+            <a:ext cx="3807196" cy="276999"/>
+          </a:xfrm>
+          <a:prstGeom prst="rect">
+            <a:avLst/>
+          </a:prstGeom>
+          <a:noFill/>
+        </p:spPr>
+        <p:txBody>
+          <a:bodyPr wrap="none" rtlCol="0">
+            <a:spAutoFit/>
+          </a:bodyPr>
+          <a:lstStyle/>
+          <a:p>
+            <a:r>
+              <a:rPr lang="en-US" sz="1200" dirty="0" err="1" smtClean="0"/>
+              <a:t>src</a:t>
+            </a:r>
+            <a:r>
+              <a:rPr lang="en-US" sz="1200" dirty="0" smtClean="0"/>
+              <a:t>/app/components/</a:t>
+            </a:r>
+            <a:r>
+              <a:rPr lang="en-US" sz="1200" dirty="0" err="1" smtClean="0"/>
+              <a:t>weatherTile</a:t>
+            </a:r>
+            <a:r>
+              <a:rPr lang="en-US" sz="1200" dirty="0" smtClean="0"/>
+              <a:t>/weatherTile.directive.js</a:t>
+            </a:r>
+            <a:endParaRPr lang="en-US" sz="1200" dirty="0"/>
+          </a:p>
+        </p:txBody>
+      </p:sp>
     </p:spTree>
     <p:extLst>
       <p:ext uri="{BB962C8B-B14F-4D97-AF65-F5344CB8AC3E}">
@@ -12962,7 +13554,12 @@
             <p:ph type="title"/>
           </p:nvPr>
         </p:nvSpPr>
-        <p:spPr/>
+        <p:spPr>
+          <a:xfrm>
+            <a:off x="310145" y="41419"/>
+            <a:ext cx="10515600" cy="1325563"/>
+          </a:xfrm>
+        </p:spPr>
         <p:txBody>
           <a:bodyPr/>
           <a:lstStyle/>
@@ -12987,7 +13584,7 @@
         </p:nvSpPr>
         <p:spPr>
           <a:xfrm>
-            <a:off x="838199" y="1366982"/>
+            <a:off x="310145" y="959434"/>
             <a:ext cx="10975109" cy="5375563"/>
           </a:xfrm>
         </p:spPr>
@@ -13174,7 +13771,7 @@
         </p:blipFill>
         <p:spPr>
           <a:xfrm>
-            <a:off x="310146" y="3793786"/>
+            <a:off x="310144" y="3660416"/>
             <a:ext cx="4136021" cy="2845531"/>
           </a:xfrm>
           <a:prstGeom prst="rect">
@@ -13198,7 +13795,7 @@
         </p:blipFill>
         <p:spPr>
           <a:xfrm>
-            <a:off x="310145" y="1779359"/>
+            <a:off x="310144" y="1366982"/>
             <a:ext cx="5548545" cy="1819875"/>
           </a:xfrm>
           <a:prstGeom prst="rect">
@@ -13230,6 +13827,82 @@
           </a:prstGeom>
         </p:spPr>
       </p:pic>
+      <p:sp>
+        <p:nvSpPr>
+          <p:cNvPr id="11" name="TextBox 10"/>
+          <p:cNvSpPr txBox="1"/>
+          <p:nvPr/>
+        </p:nvSpPr>
+        <p:spPr>
+          <a:xfrm>
+            <a:off x="196794" y="6551432"/>
+            <a:ext cx="2542171" cy="276999"/>
+          </a:xfrm>
+          <a:prstGeom prst="rect">
+            <a:avLst/>
+          </a:prstGeom>
+          <a:noFill/>
+        </p:spPr>
+        <p:txBody>
+          <a:bodyPr wrap="none" rtlCol="0">
+            <a:spAutoFit/>
+          </a:bodyPr>
+          <a:lstStyle/>
+          <a:p>
+            <a:r>
+              <a:rPr lang="en-US" sz="1200" dirty="0" err="1" smtClean="0"/>
+              <a:t>src</a:t>
+            </a:r>
+            <a:r>
+              <a:rPr lang="en-US" sz="1200" dirty="0" smtClean="0"/>
+              <a:t>/app/forecast/forecast.controller.js</a:t>
+            </a:r>
+            <a:endParaRPr lang="en-US" sz="1200" dirty="0"/>
+          </a:p>
+        </p:txBody>
+      </p:sp>
+      <p:sp>
+        <p:nvSpPr>
+          <p:cNvPr id="13" name="TextBox 12"/>
+          <p:cNvSpPr txBox="1"/>
+          <p:nvPr/>
+        </p:nvSpPr>
+        <p:spPr>
+          <a:xfrm>
+            <a:off x="310143" y="3183735"/>
+            <a:ext cx="3419782" cy="276999"/>
+          </a:xfrm>
+          <a:prstGeom prst="rect">
+            <a:avLst/>
+          </a:prstGeom>
+          <a:noFill/>
+        </p:spPr>
+        <p:txBody>
+          <a:bodyPr wrap="none" rtlCol="0">
+            <a:spAutoFit/>
+          </a:bodyPr>
+          <a:lstStyle/>
+          <a:p>
+            <a:r>
+              <a:rPr lang="en-US" sz="1200" dirty="0" err="1" smtClean="0"/>
+              <a:t>src</a:t>
+            </a:r>
+            <a:r>
+              <a:rPr lang="en-US" sz="1200" dirty="0" smtClean="0"/>
+              <a:t>/app/components/</a:t>
+            </a:r>
+            <a:r>
+              <a:rPr lang="en-US" sz="1200" dirty="0" err="1" smtClean="0"/>
+              <a:t>weatherTile</a:t>
+            </a:r>
+            <a:r>
+              <a:rPr lang="en-US" sz="1200" dirty="0" smtClean="0"/>
+              <a:t>/weatherTile.html</a:t>
+            </a:r>
+            <a:endParaRPr lang="en-US" sz="1200" dirty="0"/>
+          </a:p>
+        </p:txBody>
+      </p:sp>
     </p:spTree>
     <p:extLst>
       <p:ext uri="{BB962C8B-B14F-4D97-AF65-F5344CB8AC3E}">
@@ -14298,7 +14971,7 @@
                   <a:srgbClr val="FFC000"/>
                 </a:solidFill>
               </a:rPr>
-              <a:t>nodejs.install</a:t>
+              <a:t>nodejs</a:t>
             </a:r>
             <a:endParaRPr lang="en-US" sz="2000" dirty="0" smtClean="0">
               <a:solidFill>
@@ -16084,12 +16757,12 @@
               <a:t> </a:t>
             </a:r>
             <a:r>
-              <a:rPr lang="en-US" sz="2000" dirty="0" err="1" smtClean="0">
+              <a:rPr lang="en-US" sz="2000" dirty="0" smtClean="0">
                 <a:solidFill>
                   <a:srgbClr val="FFC000"/>
                 </a:solidFill>
               </a:rPr>
-              <a:t>weatherNg</a:t>
+              <a:t>weather</a:t>
             </a:r>
             <a:endParaRPr lang="en-US" sz="2000" dirty="0">
               <a:solidFill>
@@ -16111,12 +16784,12 @@
               <a:t>		cd </a:t>
             </a:r>
             <a:r>
-              <a:rPr lang="en-US" sz="2000" dirty="0" err="1" smtClean="0">
+              <a:rPr lang="en-US" sz="2000" dirty="0" smtClean="0">
                 <a:solidFill>
                   <a:srgbClr val="FFC000"/>
                 </a:solidFill>
               </a:rPr>
-              <a:t>weatherNg</a:t>
+              <a:t>weather</a:t>
             </a:r>
             <a:endParaRPr lang="en-US" sz="2000" dirty="0" smtClean="0">
               <a:solidFill>
@@ -17298,4 +17971,265 @@
     </a:ext>
   </a:extLst>
 </a:theme>
+</file>
+
+<file path=ppt/theme/theme3.xml><?xml version="1.0" encoding="utf-8"?>
+<a:theme xmlns:a="http://schemas.openxmlformats.org/drawingml/2006/main" name="Office Theme">
+  <a:themeElements>
+    <a:clrScheme name="Office">
+      <a:dk1>
+        <a:sysClr val="windowText" lastClr="000000"/>
+      </a:dk1>
+      <a:lt1>
+        <a:sysClr val="window" lastClr="FFFFFF"/>
+      </a:lt1>
+      <a:dk2>
+        <a:srgbClr val="44546A"/>
+      </a:dk2>
+      <a:lt2>
+        <a:srgbClr val="E7E6E6"/>
+      </a:lt2>
+      <a:accent1>
+        <a:srgbClr val="5B9BD5"/>
+      </a:accent1>
+      <a:accent2>
+        <a:srgbClr val="ED7D31"/>
+      </a:accent2>
+      <a:accent3>
+        <a:srgbClr val="A5A5A5"/>
+      </a:accent3>
+      <a:accent4>
+        <a:srgbClr val="FFC000"/>
+      </a:accent4>
+      <a:accent5>
+        <a:srgbClr val="4472C4"/>
+      </a:accent5>
+      <a:accent6>
+        <a:srgbClr val="70AD47"/>
+      </a:accent6>
+      <a:hlink>
+        <a:srgbClr val="0563C1"/>
+      </a:hlink>
+      <a:folHlink>
+        <a:srgbClr val="954F72"/>
+      </a:folHlink>
+    </a:clrScheme>
+    <a:fontScheme name="Office">
+      <a:majorFont>
+        <a:latin typeface="Calibri Light" panose="020F0302020204030204"/>
+        <a:ea typeface=""/>
+        <a:cs typeface=""/>
+        <a:font script="Jpan" typeface="ＭＳ Ｐゴシック"/>
+        <a:font script="Hang" typeface="맑은 고딕"/>
+        <a:font script="Hans" typeface="宋体"/>
+        <a:font script="Hant" typeface="新細明體"/>
+        <a:font script="Arab" typeface="Times New Roman"/>
+        <a:font script="Hebr" typeface="Times New Roman"/>
+        <a:font script="Thai" typeface="Angsana New"/>
+        <a:font script="Ethi" typeface="Nyala"/>
+        <a:font script="Beng" typeface="Vrinda"/>
+        <a:font script="Gujr" typeface="Shruti"/>
+        <a:font script="Khmr" typeface="MoolBoran"/>
+        <a:font script="Knda" typeface="Tunga"/>
+        <a:font script="Guru" typeface="Raavi"/>
+        <a:font script="Cans" typeface="Euphemia"/>
+        <a:font script="Cher" typeface="Plantagenet Cherokee"/>
+        <a:font script="Yiii" typeface="Microsoft Yi Baiti"/>
+        <a:font script="Tibt" typeface="Microsoft Himalaya"/>
+        <a:font script="Thaa" typeface="MV Boli"/>
+        <a:font script="Deva" typeface="Mangal"/>
+        <a:font script="Telu" typeface="Gautami"/>
+        <a:font script="Taml" typeface="Latha"/>
+        <a:font script="Syrc" typeface="Estrangelo Edessa"/>
+        <a:font script="Orya" typeface="Kalinga"/>
+        <a:font script="Mlym" typeface="Kartika"/>
+        <a:font script="Laoo" typeface="DokChampa"/>
+        <a:font script="Sinh" typeface="Iskoola Pota"/>
+        <a:font script="Mong" typeface="Mongolian Baiti"/>
+        <a:font script="Viet" typeface="Times New Roman"/>
+        <a:font script="Uigh" typeface="Microsoft Uighur"/>
+        <a:font script="Geor" typeface="Sylfaen"/>
+      </a:majorFont>
+      <a:minorFont>
+        <a:latin typeface="Calibri" panose="020F0502020204030204"/>
+        <a:ea typeface=""/>
+        <a:cs typeface=""/>
+        <a:font script="Jpan" typeface="ＭＳ Ｐゴシック"/>
+        <a:font script="Hang" typeface="맑은 고딕"/>
+        <a:font script="Hans" typeface="宋体"/>
+        <a:font script="Hant" typeface="新細明體"/>
+        <a:font script="Arab" typeface="Arial"/>
+        <a:font script="Hebr" typeface="Arial"/>
+        <a:font script="Thai" typeface="Cordia New"/>
+        <a:font script="Ethi" typeface="Nyala"/>
+        <a:font script="Beng" typeface="Vrinda"/>
+        <a:font script="Gujr" typeface="Shruti"/>
+        <a:font script="Khmr" typeface="DaunPenh"/>
+        <a:font script="Knda" typeface="Tunga"/>
+        <a:font script="Guru" typeface="Raavi"/>
+        <a:font script="Cans" typeface="Euphemia"/>
+        <a:font script="Cher" typeface="Plantagenet Cherokee"/>
+        <a:font script="Yiii" typeface="Microsoft Yi Baiti"/>
+        <a:font script="Tibt" typeface="Microsoft Himalaya"/>
+        <a:font script="Thaa" typeface="MV Boli"/>
+        <a:font script="Deva" typeface="Mangal"/>
+        <a:font script="Telu" typeface="Gautami"/>
+        <a:font script="Taml" typeface="Latha"/>
+        <a:font script="Syrc" typeface="Estrangelo Edessa"/>
+        <a:font script="Orya" typeface="Kalinga"/>
+        <a:font script="Mlym" typeface="Kartika"/>
+        <a:font script="Laoo" typeface="DokChampa"/>
+        <a:font script="Sinh" typeface="Iskoola Pota"/>
+        <a:font script="Mong" typeface="Mongolian Baiti"/>
+        <a:font script="Viet" typeface="Arial"/>
+        <a:font script="Uigh" typeface="Microsoft Uighur"/>
+        <a:font script="Geor" typeface="Sylfaen"/>
+      </a:minorFont>
+    </a:fontScheme>
+    <a:fmtScheme name="Office">
+      <a:fillStyleLst>
+        <a:solidFill>
+          <a:schemeClr val="phClr"/>
+        </a:solidFill>
+        <a:gradFill rotWithShape="1">
+          <a:gsLst>
+            <a:gs pos="0">
+              <a:schemeClr val="phClr">
+                <a:lumMod val="110000"/>
+                <a:satMod val="105000"/>
+                <a:tint val="67000"/>
+              </a:schemeClr>
+            </a:gs>
+            <a:gs pos="50000">
+              <a:schemeClr val="phClr">
+                <a:lumMod val="105000"/>
+                <a:satMod val="103000"/>
+                <a:tint val="73000"/>
+              </a:schemeClr>
+            </a:gs>
+            <a:gs pos="100000">
+              <a:schemeClr val="phClr">
+                <a:lumMod val="105000"/>
+                <a:satMod val="109000"/>
+                <a:tint val="81000"/>
+              </a:schemeClr>
+            </a:gs>
+          </a:gsLst>
+          <a:lin ang="5400000" scaled="0"/>
+        </a:gradFill>
+        <a:gradFill rotWithShape="1">
+          <a:gsLst>
+            <a:gs pos="0">
+              <a:schemeClr val="phClr">
+                <a:satMod val="103000"/>
+                <a:lumMod val="102000"/>
+                <a:tint val="94000"/>
+              </a:schemeClr>
+            </a:gs>
+            <a:gs pos="50000">
+              <a:schemeClr val="phClr">
+                <a:satMod val="110000"/>
+                <a:lumMod val="100000"/>
+                <a:shade val="100000"/>
+              </a:schemeClr>
+            </a:gs>
+            <a:gs pos="100000">
+              <a:schemeClr val="phClr">
+                <a:lumMod val="99000"/>
+                <a:satMod val="120000"/>
+                <a:shade val="78000"/>
+              </a:schemeClr>
+            </a:gs>
+          </a:gsLst>
+          <a:lin ang="5400000" scaled="0"/>
+        </a:gradFill>
+      </a:fillStyleLst>
+      <a:lnStyleLst>
+        <a:ln w="6350" cap="flat" cmpd="sng" algn="ctr">
+          <a:solidFill>
+            <a:schemeClr val="phClr"/>
+          </a:solidFill>
+          <a:prstDash val="solid"/>
+          <a:miter lim="800000"/>
+        </a:ln>
+        <a:ln w="12700" cap="flat" cmpd="sng" algn="ctr">
+          <a:solidFill>
+            <a:schemeClr val="phClr"/>
+          </a:solidFill>
+          <a:prstDash val="solid"/>
+          <a:miter lim="800000"/>
+        </a:ln>
+        <a:ln w="19050" cap="flat" cmpd="sng" algn="ctr">
+          <a:solidFill>
+            <a:schemeClr val="phClr"/>
+          </a:solidFill>
+          <a:prstDash val="solid"/>
+          <a:miter lim="800000"/>
+        </a:ln>
+      </a:lnStyleLst>
+      <a:effectStyleLst>
+        <a:effectStyle>
+          <a:effectLst/>
+        </a:effectStyle>
+        <a:effectStyle>
+          <a:effectLst/>
+        </a:effectStyle>
+        <a:effectStyle>
+          <a:effectLst>
+            <a:outerShdw blurRad="57150" dist="19050" dir="5400000" algn="ctr" rotWithShape="0">
+              <a:srgbClr val="000000">
+                <a:alpha val="63000"/>
+              </a:srgbClr>
+            </a:outerShdw>
+          </a:effectLst>
+        </a:effectStyle>
+      </a:effectStyleLst>
+      <a:bgFillStyleLst>
+        <a:solidFill>
+          <a:schemeClr val="phClr"/>
+        </a:solidFill>
+        <a:solidFill>
+          <a:schemeClr val="phClr">
+            <a:tint val="95000"/>
+            <a:satMod val="170000"/>
+          </a:schemeClr>
+        </a:solidFill>
+        <a:gradFill rotWithShape="1">
+          <a:gsLst>
+            <a:gs pos="0">
+              <a:schemeClr val="phClr">
+                <a:tint val="93000"/>
+                <a:satMod val="150000"/>
+                <a:shade val="98000"/>
+                <a:lumMod val="102000"/>
+              </a:schemeClr>
+            </a:gs>
+            <a:gs pos="50000">
+              <a:schemeClr val="phClr">
+                <a:tint val="98000"/>
+                <a:satMod val="130000"/>
+                <a:shade val="90000"/>
+                <a:lumMod val="103000"/>
+              </a:schemeClr>
+            </a:gs>
+            <a:gs pos="100000">
+              <a:schemeClr val="phClr">
+                <a:shade val="63000"/>
+                <a:satMod val="120000"/>
+              </a:schemeClr>
+            </a:gs>
+          </a:gsLst>
+          <a:lin ang="5400000" scaled="0"/>
+        </a:gradFill>
+      </a:bgFillStyleLst>
+    </a:fmtScheme>
+  </a:themeElements>
+  <a:objectDefaults/>
+  <a:extraClrSchemeLst/>
+  <a:extLst>
+    <a:ext uri="{05A4C25C-085E-4340-85A3-A5531E510DB2}">
+      <thm15:themeFamily xmlns:thm15="http://schemas.microsoft.com/office/thememl/2012/main" name="Office Theme" id="{62F939B6-93AF-4DB8-9C6B-D6C7DFDC589F}" vid="{4A3C46E8-61CC-4603-A589-7422A47A8E4A}"/>
+    </a:ext>
+  </a:extLst>
+</a:theme>
 </file>
</xml_diff>